<commit_message>
Finished CS580 lightning talk 5 (possibly last minute!)
</commit_message>
<xml_diff>
--- a/CSProjects/CMPSC580/Lightning Talk/5 - Immersion in the Discipline/Immersion in the Discipline.pptx
+++ b/CSProjects/CMPSC580/Lightning Talk/5 - Immersion in the Discipline/Immersion in the Discipline.pptx
@@ -53,7 +53,7 @@
       </p:grpSpPr>
       <p:sp>
         <p:nvSpPr>
-          <p:cNvPr id="40" name="PlaceHolder 1"/>
+          <p:cNvPr id="37" name="PlaceHolder 1"/>
           <p:cNvSpPr>
             <a:spLocks noGrp="1"/>
           </p:cNvSpPr>
@@ -64,7 +64,7 @@
         <p:spPr>
           <a:xfrm>
             <a:off x="457200" y="1143000"/>
-            <a:ext cx="8229240" cy="1066680"/>
+            <a:ext cx="8228880" cy="1066680"/>
           </a:xfrm>
           <a:prstGeom prst="rect">
             <a:avLst/>
@@ -73,13 +73,14 @@
         <p:txBody>
           <a:bodyPr anchor="ctr" bIns="0" lIns="0" rIns="0" tIns="0" wrap="none"/>
           <a:p>
-            <a:endParaRPr/>
-          </a:p>
-        </p:txBody>
-      </p:sp>
-      <p:sp>
-        <p:nvSpPr>
-          <p:cNvPr id="41" name="PlaceHolder 2"/>
+            <a:pPr algn="ctr"/>
+            <a:endParaRPr/>
+          </a:p>
+        </p:txBody>
+      </p:sp>
+      <p:sp>
+        <p:nvSpPr>
+          <p:cNvPr id="38" name="PlaceHolder 2"/>
           <p:cNvSpPr>
             <a:spLocks noGrp="1"/>
           </p:cNvSpPr>
@@ -90,22 +91,22 @@
         <p:spPr>
           <a:xfrm>
             <a:off x="457200" y="2249280"/>
-            <a:ext cx="4038120" cy="2158200"/>
-          </a:xfrm>
-          <a:prstGeom prst="rect">
-            <a:avLst/>
-          </a:prstGeom>
-        </p:spPr>
-        <p:txBody>
-          <a:bodyPr bIns="0" lIns="0" rIns="0" tIns="0" wrap="none"/>
-          <a:p>
-            <a:endParaRPr/>
-          </a:p>
-        </p:txBody>
-      </p:sp>
-      <p:sp>
-        <p:nvSpPr>
-          <p:cNvPr id="42" name="PlaceHolder 3"/>
+            <a:ext cx="1969920" cy="2158200"/>
+          </a:xfrm>
+          <a:prstGeom prst="rect">
+            <a:avLst/>
+          </a:prstGeom>
+        </p:spPr>
+        <p:txBody>
+          <a:bodyPr bIns="0" lIns="0" rIns="0" tIns="0" wrap="none"/>
+          <a:p>
+            <a:endParaRPr/>
+          </a:p>
+        </p:txBody>
+      </p:sp>
+      <p:sp>
+        <p:nvSpPr>
+          <p:cNvPr id="39" name="PlaceHolder 3"/>
           <p:cNvSpPr>
             <a:spLocks noGrp="1"/>
           </p:cNvSpPr>
@@ -116,7 +117,7 @@
         <p:spPr>
           <a:xfrm>
             <a:off x="457200" y="4612680"/>
-            <a:ext cx="4038120" cy="2158200"/>
+            <a:ext cx="1969920" cy="2158200"/>
           </a:xfrm>
           <a:prstGeom prst="rect">
             <a:avLst/>
@@ -153,7 +154,7 @@
       </p:grpSpPr>
       <p:sp>
         <p:nvSpPr>
-          <p:cNvPr id="43" name="PlaceHolder 1"/>
+          <p:cNvPr id="40" name="PlaceHolder 1"/>
           <p:cNvSpPr>
             <a:spLocks noGrp="1"/>
           </p:cNvSpPr>
@@ -164,7 +165,7 @@
         <p:spPr>
           <a:xfrm>
             <a:off x="457200" y="1143000"/>
-            <a:ext cx="8229240" cy="1066680"/>
+            <a:ext cx="8228880" cy="1066680"/>
           </a:xfrm>
           <a:prstGeom prst="rect">
             <a:avLst/>
@@ -173,13 +174,14 @@
         <p:txBody>
           <a:bodyPr anchor="ctr" bIns="0" lIns="0" rIns="0" tIns="0" wrap="none"/>
           <a:p>
-            <a:endParaRPr/>
-          </a:p>
-        </p:txBody>
-      </p:sp>
-      <p:sp>
-        <p:nvSpPr>
-          <p:cNvPr id="44" name="PlaceHolder 2"/>
+            <a:pPr algn="ctr"/>
+            <a:endParaRPr/>
+          </a:p>
+        </p:txBody>
+      </p:sp>
+      <p:sp>
+        <p:nvSpPr>
+          <p:cNvPr id="41" name="PlaceHolder 2"/>
           <p:cNvSpPr>
             <a:spLocks noGrp="1"/>
           </p:cNvSpPr>
@@ -190,74 +192,74 @@
         <p:spPr>
           <a:xfrm>
             <a:off x="457200" y="2249280"/>
-            <a:ext cx="1970280" cy="2158200"/>
-          </a:xfrm>
-          <a:prstGeom prst="rect">
-            <a:avLst/>
-          </a:prstGeom>
-        </p:spPr>
-        <p:txBody>
-          <a:bodyPr bIns="0" lIns="0" rIns="0" tIns="0" wrap="none"/>
-          <a:p>
-            <a:endParaRPr/>
-          </a:p>
-        </p:txBody>
-      </p:sp>
-      <p:sp>
-        <p:nvSpPr>
-          <p:cNvPr id="45" name="PlaceHolder 3"/>
-          <p:cNvSpPr>
-            <a:spLocks noGrp="1"/>
-          </p:cNvSpPr>
-          <p:nvPr>
-            <p:ph type="body"/>
-          </p:nvPr>
-        </p:nvSpPr>
-        <p:spPr>
-          <a:xfrm>
-            <a:off x="2526120" y="2249280"/>
-            <a:ext cx="1970280" cy="2158200"/>
-          </a:xfrm>
-          <a:prstGeom prst="rect">
-            <a:avLst/>
-          </a:prstGeom>
-        </p:spPr>
-        <p:txBody>
-          <a:bodyPr bIns="0" lIns="0" rIns="0" tIns="0" wrap="none"/>
-          <a:p>
-            <a:endParaRPr/>
-          </a:p>
-        </p:txBody>
-      </p:sp>
-      <p:sp>
-        <p:nvSpPr>
-          <p:cNvPr id="46" name="PlaceHolder 4"/>
-          <p:cNvSpPr>
-            <a:spLocks noGrp="1"/>
-          </p:cNvSpPr>
-          <p:nvPr>
-            <p:ph type="body"/>
-          </p:nvPr>
-        </p:nvSpPr>
-        <p:spPr>
-          <a:xfrm>
-            <a:off x="2526120" y="4612680"/>
-            <a:ext cx="1970280" cy="2158200"/>
-          </a:xfrm>
-          <a:prstGeom prst="rect">
-            <a:avLst/>
-          </a:prstGeom>
-        </p:spPr>
-        <p:txBody>
-          <a:bodyPr bIns="0" lIns="0" rIns="0" tIns="0" wrap="none"/>
-          <a:p>
-            <a:endParaRPr/>
-          </a:p>
-        </p:txBody>
-      </p:sp>
-      <p:sp>
-        <p:nvSpPr>
-          <p:cNvPr id="47" name="PlaceHolder 5"/>
+            <a:ext cx="960840" cy="2158200"/>
+          </a:xfrm>
+          <a:prstGeom prst="rect">
+            <a:avLst/>
+          </a:prstGeom>
+        </p:spPr>
+        <p:txBody>
+          <a:bodyPr bIns="0" lIns="0" rIns="0" tIns="0" wrap="none"/>
+          <a:p>
+            <a:endParaRPr/>
+          </a:p>
+        </p:txBody>
+      </p:sp>
+      <p:sp>
+        <p:nvSpPr>
+          <p:cNvPr id="42" name="PlaceHolder 3"/>
+          <p:cNvSpPr>
+            <a:spLocks noGrp="1"/>
+          </p:cNvSpPr>
+          <p:nvPr>
+            <p:ph type="body"/>
+          </p:nvPr>
+        </p:nvSpPr>
+        <p:spPr>
+          <a:xfrm>
+            <a:off x="1466280" y="2249280"/>
+            <a:ext cx="960840" cy="2158200"/>
+          </a:xfrm>
+          <a:prstGeom prst="rect">
+            <a:avLst/>
+          </a:prstGeom>
+        </p:spPr>
+        <p:txBody>
+          <a:bodyPr bIns="0" lIns="0" rIns="0" tIns="0" wrap="none"/>
+          <a:p>
+            <a:endParaRPr/>
+          </a:p>
+        </p:txBody>
+      </p:sp>
+      <p:sp>
+        <p:nvSpPr>
+          <p:cNvPr id="43" name="PlaceHolder 4"/>
+          <p:cNvSpPr>
+            <a:spLocks noGrp="1"/>
+          </p:cNvSpPr>
+          <p:nvPr>
+            <p:ph type="body"/>
+          </p:nvPr>
+        </p:nvSpPr>
+        <p:spPr>
+          <a:xfrm>
+            <a:off x="1466280" y="4612680"/>
+            <a:ext cx="960840" cy="2158200"/>
+          </a:xfrm>
+          <a:prstGeom prst="rect">
+            <a:avLst/>
+          </a:prstGeom>
+        </p:spPr>
+        <p:txBody>
+          <a:bodyPr bIns="0" lIns="0" rIns="0" tIns="0" wrap="none"/>
+          <a:p>
+            <a:endParaRPr/>
+          </a:p>
+        </p:txBody>
+      </p:sp>
+      <p:sp>
+        <p:nvSpPr>
+          <p:cNvPr id="44" name="PlaceHolder 5"/>
           <p:cNvSpPr>
             <a:spLocks noGrp="1"/>
           </p:cNvSpPr>
@@ -268,7 +270,7 @@
         <p:spPr>
           <a:xfrm>
             <a:off x="457200" y="4612680"/>
-            <a:ext cx="1970280" cy="2158200"/>
+            <a:ext cx="960840" cy="2158200"/>
           </a:xfrm>
           <a:prstGeom prst="rect">
             <a:avLst/>
@@ -305,7 +307,7 @@
       </p:grpSpPr>
       <p:sp>
         <p:nvSpPr>
-          <p:cNvPr id="48" name="PlaceHolder 1"/>
+          <p:cNvPr id="45" name="PlaceHolder 1"/>
           <p:cNvSpPr>
             <a:spLocks noGrp="1"/>
           </p:cNvSpPr>
@@ -316,7 +318,7 @@
         <p:spPr>
           <a:xfrm>
             <a:off x="457200" y="1143000"/>
-            <a:ext cx="8229240" cy="1066680"/>
+            <a:ext cx="8228880" cy="1066680"/>
           </a:xfrm>
           <a:prstGeom prst="rect">
             <a:avLst/>
@@ -325,13 +327,14 @@
         <p:txBody>
           <a:bodyPr anchor="ctr" bIns="0" lIns="0" rIns="0" tIns="0" wrap="none"/>
           <a:p>
-            <a:endParaRPr/>
-          </a:p>
-        </p:txBody>
-      </p:sp>
-      <p:sp>
-        <p:nvSpPr>
-          <p:cNvPr id="49" name="PlaceHolder 2"/>
+            <a:pPr algn="ctr"/>
+            <a:endParaRPr/>
+          </a:p>
+        </p:txBody>
+      </p:sp>
+      <p:sp>
+        <p:nvSpPr>
+          <p:cNvPr id="46" name="PlaceHolder 2"/>
           <p:cNvSpPr>
             <a:spLocks noGrp="1"/>
           </p:cNvSpPr>
@@ -342,33 +345,33 @@
         <p:spPr>
           <a:xfrm>
             <a:off x="457200" y="2249280"/>
-            <a:ext cx="1970280" cy="2158200"/>
-          </a:xfrm>
-          <a:prstGeom prst="rect">
-            <a:avLst/>
-          </a:prstGeom>
-        </p:spPr>
-        <p:txBody>
-          <a:bodyPr bIns="0" lIns="0" rIns="0" tIns="0" wrap="none"/>
-          <a:p>
-            <a:endParaRPr/>
-          </a:p>
-        </p:txBody>
-      </p:sp>
-      <p:sp>
-        <p:nvSpPr>
-          <p:cNvPr id="50" name="PlaceHolder 3"/>
-          <p:cNvSpPr>
-            <a:spLocks noGrp="1"/>
-          </p:cNvSpPr>
-          <p:nvPr>
-            <p:ph type="body"/>
-          </p:nvPr>
-        </p:nvSpPr>
-        <p:spPr>
-          <a:xfrm>
-            <a:off x="2526120" y="2249280"/>
-            <a:ext cx="1970280" cy="2158200"/>
+            <a:ext cx="960840" cy="2158200"/>
+          </a:xfrm>
+          <a:prstGeom prst="rect">
+            <a:avLst/>
+          </a:prstGeom>
+        </p:spPr>
+        <p:txBody>
+          <a:bodyPr bIns="0" lIns="0" rIns="0" tIns="0" wrap="none"/>
+          <a:p>
+            <a:endParaRPr/>
+          </a:p>
+        </p:txBody>
+      </p:sp>
+      <p:sp>
+        <p:nvSpPr>
+          <p:cNvPr id="47" name="PlaceHolder 3"/>
+          <p:cNvSpPr>
+            <a:spLocks noGrp="1"/>
+          </p:cNvSpPr>
+          <p:nvPr>
+            <p:ph type="body"/>
+          </p:nvPr>
+        </p:nvSpPr>
+        <p:spPr>
+          <a:xfrm>
+            <a:off x="1466280" y="2249280"/>
+            <a:ext cx="960840" cy="2158200"/>
           </a:xfrm>
           <a:prstGeom prst="rect">
             <a:avLst/>
@@ -405,7 +408,7 @@
       </p:grpSpPr>
       <p:sp>
         <p:nvSpPr>
-          <p:cNvPr id="19" name="PlaceHolder 1"/>
+          <p:cNvPr id="16" name="PlaceHolder 1"/>
           <p:cNvSpPr>
             <a:spLocks noGrp="1"/>
           </p:cNvSpPr>
@@ -416,7 +419,7 @@
         <p:spPr>
           <a:xfrm>
             <a:off x="457200" y="1143000"/>
-            <a:ext cx="8229240" cy="1066680"/>
+            <a:ext cx="8228880" cy="1066680"/>
           </a:xfrm>
           <a:prstGeom prst="rect">
             <a:avLst/>
@@ -425,13 +428,14 @@
         <p:txBody>
           <a:bodyPr anchor="ctr" bIns="0" lIns="0" rIns="0" tIns="0" wrap="none"/>
           <a:p>
-            <a:endParaRPr/>
-          </a:p>
-        </p:txBody>
-      </p:sp>
-      <p:sp>
-        <p:nvSpPr>
-          <p:cNvPr id="20" name="PlaceHolder 2"/>
+            <a:pPr algn="ctr"/>
+            <a:endParaRPr/>
+          </a:p>
+        </p:txBody>
+      </p:sp>
+      <p:sp>
+        <p:nvSpPr>
+          <p:cNvPr id="17" name="PlaceHolder 2"/>
           <p:cNvSpPr>
             <a:spLocks noGrp="1"/>
           </p:cNvSpPr>
@@ -442,7 +446,7 @@
         <p:spPr>
           <a:xfrm>
             <a:off x="457200" y="2249280"/>
-            <a:ext cx="4038120" cy="4525920"/>
+            <a:ext cx="1969920" cy="4525560"/>
           </a:xfrm>
           <a:prstGeom prst="rect">
             <a:avLst/>
@@ -480,7 +484,7 @@
       </p:grpSpPr>
       <p:sp>
         <p:nvSpPr>
-          <p:cNvPr id="21" name="PlaceHolder 1"/>
+          <p:cNvPr id="18" name="PlaceHolder 1"/>
           <p:cNvSpPr>
             <a:spLocks noGrp="1"/>
           </p:cNvSpPr>
@@ -491,7 +495,7 @@
         <p:spPr>
           <a:xfrm>
             <a:off x="457200" y="1143000"/>
-            <a:ext cx="8229240" cy="1066680"/>
+            <a:ext cx="8228880" cy="1066680"/>
           </a:xfrm>
           <a:prstGeom prst="rect">
             <a:avLst/>
@@ -500,13 +504,14 @@
         <p:txBody>
           <a:bodyPr anchor="ctr" bIns="0" lIns="0" rIns="0" tIns="0" wrap="none"/>
           <a:p>
-            <a:endParaRPr/>
-          </a:p>
-        </p:txBody>
-      </p:sp>
-      <p:sp>
-        <p:nvSpPr>
-          <p:cNvPr id="22" name="PlaceHolder 2"/>
+            <a:pPr algn="ctr"/>
+            <a:endParaRPr/>
+          </a:p>
+        </p:txBody>
+      </p:sp>
+      <p:sp>
+        <p:nvSpPr>
+          <p:cNvPr id="19" name="PlaceHolder 2"/>
           <p:cNvSpPr>
             <a:spLocks noGrp="1"/>
           </p:cNvSpPr>
@@ -517,7 +522,7 @@
         <p:spPr>
           <a:xfrm>
             <a:off x="457200" y="2249280"/>
-            <a:ext cx="4038120" cy="4525560"/>
+            <a:ext cx="1969920" cy="4525200"/>
           </a:xfrm>
           <a:prstGeom prst="rect">
             <a:avLst/>
@@ -554,7 +559,7 @@
       </p:grpSpPr>
       <p:sp>
         <p:nvSpPr>
-          <p:cNvPr id="23" name="PlaceHolder 1"/>
+          <p:cNvPr id="20" name="PlaceHolder 1"/>
           <p:cNvSpPr>
             <a:spLocks noGrp="1"/>
           </p:cNvSpPr>
@@ -565,7 +570,7 @@
         <p:spPr>
           <a:xfrm>
             <a:off x="457200" y="1143000"/>
-            <a:ext cx="8229240" cy="1066680"/>
+            <a:ext cx="8228880" cy="1066680"/>
           </a:xfrm>
           <a:prstGeom prst="rect">
             <a:avLst/>
@@ -574,13 +579,14 @@
         <p:txBody>
           <a:bodyPr anchor="ctr" bIns="0" lIns="0" rIns="0" tIns="0" wrap="none"/>
           <a:p>
-            <a:endParaRPr/>
-          </a:p>
-        </p:txBody>
-      </p:sp>
-      <p:sp>
-        <p:nvSpPr>
-          <p:cNvPr id="24" name="PlaceHolder 2"/>
+            <a:pPr algn="ctr"/>
+            <a:endParaRPr/>
+          </a:p>
+        </p:txBody>
+      </p:sp>
+      <p:sp>
+        <p:nvSpPr>
+          <p:cNvPr id="21" name="PlaceHolder 2"/>
           <p:cNvSpPr>
             <a:spLocks noGrp="1"/>
           </p:cNvSpPr>
@@ -591,33 +597,33 @@
         <p:spPr>
           <a:xfrm>
             <a:off x="457200" y="2249280"/>
-            <a:ext cx="1970280" cy="4525560"/>
-          </a:xfrm>
-          <a:prstGeom prst="rect">
-            <a:avLst/>
-          </a:prstGeom>
-        </p:spPr>
-        <p:txBody>
-          <a:bodyPr bIns="0" lIns="0" rIns="0" tIns="0" wrap="none"/>
-          <a:p>
-            <a:endParaRPr/>
-          </a:p>
-        </p:txBody>
-      </p:sp>
-      <p:sp>
-        <p:nvSpPr>
-          <p:cNvPr id="25" name="PlaceHolder 3"/>
-          <p:cNvSpPr>
-            <a:spLocks noGrp="1"/>
-          </p:cNvSpPr>
-          <p:nvPr>
-            <p:ph type="body"/>
-          </p:nvPr>
-        </p:nvSpPr>
-        <p:spPr>
-          <a:xfrm>
-            <a:off x="2526120" y="2249280"/>
-            <a:ext cx="1970280" cy="4525560"/>
+            <a:ext cx="960840" cy="4525200"/>
+          </a:xfrm>
+          <a:prstGeom prst="rect">
+            <a:avLst/>
+          </a:prstGeom>
+        </p:spPr>
+        <p:txBody>
+          <a:bodyPr bIns="0" lIns="0" rIns="0" tIns="0" wrap="none"/>
+          <a:p>
+            <a:endParaRPr/>
+          </a:p>
+        </p:txBody>
+      </p:sp>
+      <p:sp>
+        <p:nvSpPr>
+          <p:cNvPr id="22" name="PlaceHolder 3"/>
+          <p:cNvSpPr>
+            <a:spLocks noGrp="1"/>
+          </p:cNvSpPr>
+          <p:nvPr>
+            <p:ph type="body"/>
+          </p:nvPr>
+        </p:nvSpPr>
+        <p:spPr>
+          <a:xfrm>
+            <a:off x="1466280" y="2249280"/>
+            <a:ext cx="960840" cy="4525200"/>
           </a:xfrm>
           <a:prstGeom prst="rect">
             <a:avLst/>
@@ -654,7 +660,7 @@
       </p:grpSpPr>
       <p:sp>
         <p:nvSpPr>
-          <p:cNvPr id="26" name="PlaceHolder 1"/>
+          <p:cNvPr id="23" name="PlaceHolder 1"/>
           <p:cNvSpPr>
             <a:spLocks noGrp="1"/>
           </p:cNvSpPr>
@@ -665,7 +671,7 @@
         <p:spPr>
           <a:xfrm>
             <a:off x="457200" y="1143000"/>
-            <a:ext cx="8229240" cy="1066680"/>
+            <a:ext cx="8228880" cy="1066680"/>
           </a:xfrm>
           <a:prstGeom prst="rect">
             <a:avLst/>
@@ -674,6 +680,7 @@
         <p:txBody>
           <a:bodyPr anchor="ctr" bIns="0" lIns="0" rIns="0" tIns="0" wrap="none"/>
           <a:p>
+            <a:pPr algn="ctr"/>
             <a:endParaRPr/>
           </a:p>
         </p:txBody>
@@ -702,7 +709,7 @@
       </p:grpSpPr>
       <p:sp>
         <p:nvSpPr>
-          <p:cNvPr id="27" name="PlaceHolder 1"/>
+          <p:cNvPr id="24" name="PlaceHolder 1"/>
           <p:cNvSpPr>
             <a:spLocks noGrp="1"/>
           </p:cNvSpPr>
@@ -713,7 +720,7 @@
         <p:spPr>
           <a:xfrm>
             <a:off x="457200" y="1143000"/>
-            <a:ext cx="8229240" cy="5631840"/>
+            <a:ext cx="8228880" cy="5631480"/>
           </a:xfrm>
           <a:prstGeom prst="rect">
             <a:avLst/>
@@ -751,7 +758,7 @@
       </p:grpSpPr>
       <p:sp>
         <p:nvSpPr>
-          <p:cNvPr id="28" name="PlaceHolder 1"/>
+          <p:cNvPr id="25" name="PlaceHolder 1"/>
           <p:cNvSpPr>
             <a:spLocks noGrp="1"/>
           </p:cNvSpPr>
@@ -762,7 +769,7 @@
         <p:spPr>
           <a:xfrm>
             <a:off x="457200" y="1143000"/>
-            <a:ext cx="8229240" cy="1066680"/>
+            <a:ext cx="8228880" cy="1066680"/>
           </a:xfrm>
           <a:prstGeom prst="rect">
             <a:avLst/>
@@ -771,13 +778,14 @@
         <p:txBody>
           <a:bodyPr anchor="ctr" bIns="0" lIns="0" rIns="0" tIns="0" wrap="none"/>
           <a:p>
-            <a:endParaRPr/>
-          </a:p>
-        </p:txBody>
-      </p:sp>
-      <p:sp>
-        <p:nvSpPr>
-          <p:cNvPr id="29" name="PlaceHolder 2"/>
+            <a:pPr algn="ctr"/>
+            <a:endParaRPr/>
+          </a:p>
+        </p:txBody>
+      </p:sp>
+      <p:sp>
+        <p:nvSpPr>
+          <p:cNvPr id="26" name="PlaceHolder 2"/>
           <p:cNvSpPr>
             <a:spLocks noGrp="1"/>
           </p:cNvSpPr>
@@ -788,22 +796,22 @@
         <p:spPr>
           <a:xfrm>
             <a:off x="457200" y="2249280"/>
-            <a:ext cx="1970280" cy="2158200"/>
-          </a:xfrm>
-          <a:prstGeom prst="rect">
-            <a:avLst/>
-          </a:prstGeom>
-        </p:spPr>
-        <p:txBody>
-          <a:bodyPr bIns="0" lIns="0" rIns="0" tIns="0" wrap="none"/>
-          <a:p>
-            <a:endParaRPr/>
-          </a:p>
-        </p:txBody>
-      </p:sp>
-      <p:sp>
-        <p:nvSpPr>
-          <p:cNvPr id="30" name="PlaceHolder 3"/>
+            <a:ext cx="960840" cy="2158200"/>
+          </a:xfrm>
+          <a:prstGeom prst="rect">
+            <a:avLst/>
+          </a:prstGeom>
+        </p:spPr>
+        <p:txBody>
+          <a:bodyPr bIns="0" lIns="0" rIns="0" tIns="0" wrap="none"/>
+          <a:p>
+            <a:endParaRPr/>
+          </a:p>
+        </p:txBody>
+      </p:sp>
+      <p:sp>
+        <p:nvSpPr>
+          <p:cNvPr id="27" name="PlaceHolder 3"/>
           <p:cNvSpPr>
             <a:spLocks noGrp="1"/>
           </p:cNvSpPr>
@@ -814,33 +822,33 @@
         <p:spPr>
           <a:xfrm>
             <a:off x="457200" y="4612680"/>
-            <a:ext cx="1970280" cy="2158200"/>
-          </a:xfrm>
-          <a:prstGeom prst="rect">
-            <a:avLst/>
-          </a:prstGeom>
-        </p:spPr>
-        <p:txBody>
-          <a:bodyPr bIns="0" lIns="0" rIns="0" tIns="0" wrap="none"/>
-          <a:p>
-            <a:endParaRPr/>
-          </a:p>
-        </p:txBody>
-      </p:sp>
-      <p:sp>
-        <p:nvSpPr>
-          <p:cNvPr id="31" name="PlaceHolder 4"/>
-          <p:cNvSpPr>
-            <a:spLocks noGrp="1"/>
-          </p:cNvSpPr>
-          <p:nvPr>
-            <p:ph type="body"/>
-          </p:nvPr>
-        </p:nvSpPr>
-        <p:spPr>
-          <a:xfrm>
-            <a:off x="2526120" y="2249280"/>
-            <a:ext cx="1970280" cy="4525560"/>
+            <a:ext cx="960840" cy="2158200"/>
+          </a:xfrm>
+          <a:prstGeom prst="rect">
+            <a:avLst/>
+          </a:prstGeom>
+        </p:spPr>
+        <p:txBody>
+          <a:bodyPr bIns="0" lIns="0" rIns="0" tIns="0" wrap="none"/>
+          <a:p>
+            <a:endParaRPr/>
+          </a:p>
+        </p:txBody>
+      </p:sp>
+      <p:sp>
+        <p:nvSpPr>
+          <p:cNvPr id="28" name="PlaceHolder 4"/>
+          <p:cNvSpPr>
+            <a:spLocks noGrp="1"/>
+          </p:cNvSpPr>
+          <p:nvPr>
+            <p:ph type="body"/>
+          </p:nvPr>
+        </p:nvSpPr>
+        <p:spPr>
+          <a:xfrm>
+            <a:off x="1466280" y="2249280"/>
+            <a:ext cx="960840" cy="4525200"/>
           </a:xfrm>
           <a:prstGeom prst="rect">
             <a:avLst/>
@@ -877,7 +885,7 @@
       </p:grpSpPr>
       <p:sp>
         <p:nvSpPr>
-          <p:cNvPr id="32" name="PlaceHolder 1"/>
+          <p:cNvPr id="29" name="PlaceHolder 1"/>
           <p:cNvSpPr>
             <a:spLocks noGrp="1"/>
           </p:cNvSpPr>
@@ -888,7 +896,7 @@
         <p:spPr>
           <a:xfrm>
             <a:off x="457200" y="1143000"/>
-            <a:ext cx="8229240" cy="1066680"/>
+            <a:ext cx="8228880" cy="1066680"/>
           </a:xfrm>
           <a:prstGeom prst="rect">
             <a:avLst/>
@@ -897,13 +905,14 @@
         <p:txBody>
           <a:bodyPr anchor="ctr" bIns="0" lIns="0" rIns="0" tIns="0" wrap="none"/>
           <a:p>
-            <a:endParaRPr/>
-          </a:p>
-        </p:txBody>
-      </p:sp>
-      <p:sp>
-        <p:nvSpPr>
-          <p:cNvPr id="33" name="PlaceHolder 2"/>
+            <a:pPr algn="ctr"/>
+            <a:endParaRPr/>
+          </a:p>
+        </p:txBody>
+      </p:sp>
+      <p:sp>
+        <p:nvSpPr>
+          <p:cNvPr id="30" name="PlaceHolder 2"/>
           <p:cNvSpPr>
             <a:spLocks noGrp="1"/>
           </p:cNvSpPr>
@@ -914,59 +923,59 @@
         <p:spPr>
           <a:xfrm>
             <a:off x="457200" y="2249280"/>
-            <a:ext cx="1970280" cy="4525560"/>
-          </a:xfrm>
-          <a:prstGeom prst="rect">
-            <a:avLst/>
-          </a:prstGeom>
-        </p:spPr>
-        <p:txBody>
-          <a:bodyPr bIns="0" lIns="0" rIns="0" tIns="0" wrap="none"/>
-          <a:p>
-            <a:endParaRPr/>
-          </a:p>
-        </p:txBody>
-      </p:sp>
-      <p:sp>
-        <p:nvSpPr>
-          <p:cNvPr id="34" name="PlaceHolder 3"/>
-          <p:cNvSpPr>
-            <a:spLocks noGrp="1"/>
-          </p:cNvSpPr>
-          <p:nvPr>
-            <p:ph type="body"/>
-          </p:nvPr>
-        </p:nvSpPr>
-        <p:spPr>
-          <a:xfrm>
-            <a:off x="2526120" y="2249280"/>
-            <a:ext cx="1970280" cy="2158200"/>
-          </a:xfrm>
-          <a:prstGeom prst="rect">
-            <a:avLst/>
-          </a:prstGeom>
-        </p:spPr>
-        <p:txBody>
-          <a:bodyPr bIns="0" lIns="0" rIns="0" tIns="0" wrap="none"/>
-          <a:p>
-            <a:endParaRPr/>
-          </a:p>
-        </p:txBody>
-      </p:sp>
-      <p:sp>
-        <p:nvSpPr>
-          <p:cNvPr id="35" name="PlaceHolder 4"/>
-          <p:cNvSpPr>
-            <a:spLocks noGrp="1"/>
-          </p:cNvSpPr>
-          <p:nvPr>
-            <p:ph type="body"/>
-          </p:nvPr>
-        </p:nvSpPr>
-        <p:spPr>
-          <a:xfrm>
-            <a:off x="2526120" y="4612680"/>
-            <a:ext cx="1970280" cy="2158200"/>
+            <a:ext cx="960840" cy="4525200"/>
+          </a:xfrm>
+          <a:prstGeom prst="rect">
+            <a:avLst/>
+          </a:prstGeom>
+        </p:spPr>
+        <p:txBody>
+          <a:bodyPr bIns="0" lIns="0" rIns="0" tIns="0" wrap="none"/>
+          <a:p>
+            <a:endParaRPr/>
+          </a:p>
+        </p:txBody>
+      </p:sp>
+      <p:sp>
+        <p:nvSpPr>
+          <p:cNvPr id="31" name="PlaceHolder 3"/>
+          <p:cNvSpPr>
+            <a:spLocks noGrp="1"/>
+          </p:cNvSpPr>
+          <p:nvPr>
+            <p:ph type="body"/>
+          </p:nvPr>
+        </p:nvSpPr>
+        <p:spPr>
+          <a:xfrm>
+            <a:off x="1466280" y="2249280"/>
+            <a:ext cx="960840" cy="2158200"/>
+          </a:xfrm>
+          <a:prstGeom prst="rect">
+            <a:avLst/>
+          </a:prstGeom>
+        </p:spPr>
+        <p:txBody>
+          <a:bodyPr bIns="0" lIns="0" rIns="0" tIns="0" wrap="none"/>
+          <a:p>
+            <a:endParaRPr/>
+          </a:p>
+        </p:txBody>
+      </p:sp>
+      <p:sp>
+        <p:nvSpPr>
+          <p:cNvPr id="32" name="PlaceHolder 4"/>
+          <p:cNvSpPr>
+            <a:spLocks noGrp="1"/>
+          </p:cNvSpPr>
+          <p:nvPr>
+            <p:ph type="body"/>
+          </p:nvPr>
+        </p:nvSpPr>
+        <p:spPr>
+          <a:xfrm>
+            <a:off x="1466280" y="4612680"/>
+            <a:ext cx="960840" cy="2158200"/>
           </a:xfrm>
           <a:prstGeom prst="rect">
             <a:avLst/>
@@ -1003,7 +1012,7 @@
       </p:grpSpPr>
       <p:sp>
         <p:nvSpPr>
-          <p:cNvPr id="36" name="PlaceHolder 1"/>
+          <p:cNvPr id="33" name="PlaceHolder 1"/>
           <p:cNvSpPr>
             <a:spLocks noGrp="1"/>
           </p:cNvSpPr>
@@ -1014,7 +1023,7 @@
         <p:spPr>
           <a:xfrm>
             <a:off x="457200" y="1143000"/>
-            <a:ext cx="8229240" cy="1066680"/>
+            <a:ext cx="8228880" cy="1066680"/>
           </a:xfrm>
           <a:prstGeom prst="rect">
             <a:avLst/>
@@ -1023,13 +1032,14 @@
         <p:txBody>
           <a:bodyPr anchor="ctr" bIns="0" lIns="0" rIns="0" tIns="0" wrap="none"/>
           <a:p>
-            <a:endParaRPr/>
-          </a:p>
-        </p:txBody>
-      </p:sp>
-      <p:sp>
-        <p:nvSpPr>
-          <p:cNvPr id="37" name="PlaceHolder 2"/>
+            <a:pPr algn="ctr"/>
+            <a:endParaRPr/>
+          </a:p>
+        </p:txBody>
+      </p:sp>
+      <p:sp>
+        <p:nvSpPr>
+          <p:cNvPr id="34" name="PlaceHolder 2"/>
           <p:cNvSpPr>
             <a:spLocks noGrp="1"/>
           </p:cNvSpPr>
@@ -1040,48 +1050,48 @@
         <p:spPr>
           <a:xfrm>
             <a:off x="457200" y="2249280"/>
-            <a:ext cx="1970280" cy="2158200"/>
-          </a:xfrm>
-          <a:prstGeom prst="rect">
-            <a:avLst/>
-          </a:prstGeom>
-        </p:spPr>
-        <p:txBody>
-          <a:bodyPr bIns="0" lIns="0" rIns="0" tIns="0" wrap="none"/>
-          <a:p>
-            <a:endParaRPr/>
-          </a:p>
-        </p:txBody>
-      </p:sp>
-      <p:sp>
-        <p:nvSpPr>
-          <p:cNvPr id="38" name="PlaceHolder 3"/>
-          <p:cNvSpPr>
-            <a:spLocks noGrp="1"/>
-          </p:cNvSpPr>
-          <p:nvPr>
-            <p:ph type="body"/>
-          </p:nvPr>
-        </p:nvSpPr>
-        <p:spPr>
-          <a:xfrm>
-            <a:off x="2526120" y="2249280"/>
-            <a:ext cx="1970280" cy="2158200"/>
-          </a:xfrm>
-          <a:prstGeom prst="rect">
-            <a:avLst/>
-          </a:prstGeom>
-        </p:spPr>
-        <p:txBody>
-          <a:bodyPr bIns="0" lIns="0" rIns="0" tIns="0" wrap="none"/>
-          <a:p>
-            <a:endParaRPr/>
-          </a:p>
-        </p:txBody>
-      </p:sp>
-      <p:sp>
-        <p:nvSpPr>
-          <p:cNvPr id="39" name="PlaceHolder 4"/>
+            <a:ext cx="960840" cy="2158200"/>
+          </a:xfrm>
+          <a:prstGeom prst="rect">
+            <a:avLst/>
+          </a:prstGeom>
+        </p:spPr>
+        <p:txBody>
+          <a:bodyPr bIns="0" lIns="0" rIns="0" tIns="0" wrap="none"/>
+          <a:p>
+            <a:endParaRPr/>
+          </a:p>
+        </p:txBody>
+      </p:sp>
+      <p:sp>
+        <p:nvSpPr>
+          <p:cNvPr id="35" name="PlaceHolder 3"/>
+          <p:cNvSpPr>
+            <a:spLocks noGrp="1"/>
+          </p:cNvSpPr>
+          <p:nvPr>
+            <p:ph type="body"/>
+          </p:nvPr>
+        </p:nvSpPr>
+        <p:spPr>
+          <a:xfrm>
+            <a:off x="1466280" y="2249280"/>
+            <a:ext cx="960840" cy="2158200"/>
+          </a:xfrm>
+          <a:prstGeom prst="rect">
+            <a:avLst/>
+          </a:prstGeom>
+        </p:spPr>
+        <p:txBody>
+          <a:bodyPr bIns="0" lIns="0" rIns="0" tIns="0" wrap="none"/>
+          <a:p>
+            <a:endParaRPr/>
+          </a:p>
+        </p:txBody>
+      </p:sp>
+      <p:sp>
+        <p:nvSpPr>
+          <p:cNvPr id="36" name="PlaceHolder 4"/>
           <p:cNvSpPr>
             <a:spLocks noGrp="1"/>
           </p:cNvSpPr>
@@ -1092,7 +1102,7 @@
         <p:spPr>
           <a:xfrm>
             <a:off x="457200" y="4612680"/>
-            <a:ext cx="4037760" cy="2158200"/>
+            <a:ext cx="1969200" cy="2158200"/>
           </a:xfrm>
           <a:prstGeom prst="rect">
             <a:avLst/>
@@ -1143,7 +1153,7 @@
         <p:spPr>
           <a:xfrm>
             <a:off x="0" y="366840"/>
-            <a:ext cx="9143640" cy="83880"/>
+            <a:ext cx="9143280" cy="83520"/>
           </a:xfrm>
           <a:prstGeom prst="rect">
             <a:avLst/>
@@ -1162,7 +1172,7 @@
         <p:spPr>
           <a:xfrm>
             <a:off x="0" y="0"/>
-            <a:ext cx="9143640" cy="310320"/>
+            <a:ext cx="9143280" cy="309960"/>
           </a:xfrm>
           <a:prstGeom prst="rect">
             <a:avLst/>
@@ -1181,7 +1191,7 @@
         <p:spPr>
           <a:xfrm>
             <a:off x="0" y="308160"/>
-            <a:ext cx="9143640" cy="91080"/>
+            <a:ext cx="9143280" cy="90720"/>
           </a:xfrm>
           <a:prstGeom prst="rect">
             <a:avLst/>
@@ -1200,7 +1210,7 @@
         <p:spPr>
           <a:xfrm>
             <a:off x="5410080" y="360360"/>
-            <a:ext cx="3733560" cy="90720"/>
+            <a:ext cx="3733200" cy="90360"/>
           </a:xfrm>
           <a:prstGeom prst="rect">
             <a:avLst/>
@@ -1219,7 +1229,7 @@
         <p:spPr>
           <a:xfrm>
             <a:off x="5410080" y="439560"/>
-            <a:ext cx="3733560" cy="179640"/>
+            <a:ext cx="3733200" cy="179280"/>
           </a:xfrm>
           <a:prstGeom prst="rect">
             <a:avLst/>
@@ -1238,12 +1248,10 @@
         <p:spPr>
           <a:xfrm>
             <a:off x="5407200" y="497520"/>
-            <a:ext cx="3062880" cy="27000"/>
-          </a:xfrm>
-          <a:prstGeom prst="rect">
-            <a:avLst>
-              <a:gd fmla="val 16667" name="adj"/>
-            </a:avLst>
+            <a:ext cx="3062520" cy="26640"/>
+          </a:xfrm>
+          <a:prstGeom prst="rect">
+            <a:avLst/>
           </a:prstGeom>
           <a:solidFill>
             <a:srgbClr val="53548a"/>
@@ -1259,12 +1267,10 @@
         <p:spPr>
           <a:xfrm>
             <a:off x="7373520" y="588960"/>
-            <a:ext cx="1599840" cy="36360"/>
-          </a:xfrm>
-          <a:prstGeom prst="rect">
-            <a:avLst>
-              <a:gd fmla="val 16667" name="adj"/>
-            </a:avLst>
+            <a:ext cx="1599480" cy="36000"/>
+          </a:xfrm>
+          <a:prstGeom prst="rect">
+            <a:avLst/>
           </a:prstGeom>
           <a:solidFill>
             <a:srgbClr val="53548a"/>
@@ -1280,7 +1286,7 @@
         <p:spPr>
           <a:xfrm>
             <a:off x="9084960" y="-2160"/>
-            <a:ext cx="57240" cy="621360"/>
+            <a:ext cx="56880" cy="621000"/>
           </a:xfrm>
           <a:prstGeom prst="rect">
             <a:avLst/>
@@ -1299,7 +1305,7 @@
         <p:spPr>
           <a:xfrm>
             <a:off x="9044640" y="-2160"/>
-            <a:ext cx="27000" cy="621360"/>
+            <a:ext cx="26640" cy="621000"/>
           </a:xfrm>
           <a:prstGeom prst="rect">
             <a:avLst/>
@@ -1318,7 +1324,7 @@
         <p:spPr>
           <a:xfrm>
             <a:off x="9025560" y="-2160"/>
-            <a:ext cx="8640" cy="621360"/>
+            <a:ext cx="8280" cy="621000"/>
           </a:xfrm>
           <a:prstGeom prst="rect">
             <a:avLst/>
@@ -1337,7 +1343,7 @@
         <p:spPr>
           <a:xfrm>
             <a:off x="8975520" y="-2160"/>
-            <a:ext cx="27000" cy="621360"/>
+            <a:ext cx="26640" cy="621000"/>
           </a:xfrm>
           <a:prstGeom prst="rect">
             <a:avLst/>
@@ -1356,7 +1362,7 @@
         <p:spPr>
           <a:xfrm>
             <a:off x="8915760" y="360"/>
-            <a:ext cx="54360" cy="585000"/>
+            <a:ext cx="54000" cy="584640"/>
           </a:xfrm>
           <a:prstGeom prst="rect">
             <a:avLst/>
@@ -1375,7 +1381,7 @@
         <p:spPr>
           <a:xfrm>
             <a:off x="8873640" y="360"/>
-            <a:ext cx="8640" cy="585000"/>
+            <a:ext cx="8280" cy="584640"/>
           </a:xfrm>
           <a:prstGeom prst="rect">
             <a:avLst/>
@@ -1398,28 +1404,18 @@
         <p:spPr>
           <a:xfrm>
             <a:off x="457200" y="1143000"/>
-            <a:ext cx="8229240" cy="1066320"/>
-          </a:xfrm>
-          <a:prstGeom prst="rect">
-            <a:avLst/>
-          </a:prstGeom>
-        </p:spPr>
-        <p:txBody>
-          <a:bodyPr anchor="ctr" bIns="45000" lIns="90000" rIns="90000" tIns="45000"/>
-          <a:p>
-            <a:pPr>
-              <a:lnSpc>
-                <a:spcPct val="100000"/>
-              </a:lnSpc>
-            </a:pPr>
+            <a:ext cx="8228880" cy="1066320"/>
+          </a:xfrm>
+          <a:prstGeom prst="rect">
+            <a:avLst/>
+          </a:prstGeom>
+        </p:spPr>
+        <p:txBody>
+          <a:bodyPr anchor="ctr" bIns="0" lIns="0" rIns="0" tIns="0" wrap="none"/>
+          <a:p>
             <a:r>
-              <a:rPr lang="en-US" sz="4000">
-                <a:solidFill>
-                  <a:srgbClr val="dedede"/>
-                </a:solidFill>
-                <a:latin typeface="Trebuchet MS"/>
-              </a:rPr>
-              <a:t>Click to edit the title text formatClick to edit Master title style</a:t>
+              <a:rPr lang="en-US"/>
+              <a:t>Click to edit the title text format</a:t>
             </a:r>
             <a:endParaRPr/>
           </a:p>
@@ -1438,27 +1434,17 @@
         <p:spPr>
           <a:xfrm>
             <a:off x="457200" y="2249280"/>
-            <a:ext cx="4038120" cy="4525560"/>
-          </a:xfrm>
-          <a:prstGeom prst="rect">
-            <a:avLst/>
-          </a:prstGeom>
-        </p:spPr>
-        <p:txBody>
-          <a:bodyPr bIns="45000" lIns="90000" rIns="90000" tIns="45000"/>
-          <a:p>
-            <a:pPr>
-              <a:buSzPct val="45000"/>
-              <a:buFont typeface="StarSymbol"/>
-              <a:buChar char=""/>
-            </a:pPr>
+            <a:ext cx="1969920" cy="4525200"/>
+          </a:xfrm>
+          <a:prstGeom prst="rect">
+            <a:avLst/>
+          </a:prstGeom>
+        </p:spPr>
+        <p:txBody>
+          <a:bodyPr bIns="0" lIns="0" rIns="0" tIns="0" wrap="none"/>
+          <a:p>
             <a:r>
-              <a:rPr lang="en-US" sz="2000">
-                <a:solidFill>
-                  <a:srgbClr val="ffffff"/>
-                </a:solidFill>
-                <a:latin typeface="Georgia"/>
-              </a:rPr>
+              <a:rPr lang="en-US"/>
               <a:t>Click to edit the outline text format</a:t>
             </a:r>
             <a:endParaRPr/>
@@ -1470,12 +1456,7 @@
               <a:buChar char=""/>
             </a:pPr>
             <a:r>
-              <a:rPr lang="en-US" sz="2000">
-                <a:solidFill>
-                  <a:srgbClr val="ffffff"/>
-                </a:solidFill>
-                <a:latin typeface="Georgia"/>
-              </a:rPr>
+              <a:rPr lang="en-US"/>
               <a:t>Second Outline Level</a:t>
             </a:r>
             <a:endParaRPr/>
@@ -1487,12 +1468,7 @@
               <a:buChar char=""/>
             </a:pPr>
             <a:r>
-              <a:rPr lang="en-US" sz="2000">
-                <a:solidFill>
-                  <a:srgbClr val="ffffff"/>
-                </a:solidFill>
-                <a:latin typeface="Georgia"/>
-              </a:rPr>
+              <a:rPr lang="en-US"/>
               <a:t>Third Outline Level</a:t>
             </a:r>
             <a:endParaRPr/>
@@ -1504,12 +1480,7 @@
               <a:buChar char=""/>
             </a:pPr>
             <a:r>
-              <a:rPr lang="en-US" sz="2000">
-                <a:solidFill>
-                  <a:srgbClr val="ffffff"/>
-                </a:solidFill>
-                <a:latin typeface="Georgia"/>
-              </a:rPr>
+              <a:rPr lang="en-US"/>
               <a:t>Fourth Outline Level</a:t>
             </a:r>
             <a:endParaRPr/>
@@ -1521,12 +1492,7 @@
               <a:buChar char=""/>
             </a:pPr>
             <a:r>
-              <a:rPr lang="en-US" sz="2000">
-                <a:solidFill>
-                  <a:srgbClr val="ffffff"/>
-                </a:solidFill>
-                <a:latin typeface="Georgia"/>
-              </a:rPr>
+              <a:rPr lang="en-US"/>
               <a:t>Fifth Outline Level</a:t>
             </a:r>
             <a:endParaRPr/>
@@ -1538,138 +1504,49 @@
               <a:buChar char=""/>
             </a:pPr>
             <a:r>
-              <a:rPr lang="en-US" sz="2000">
-                <a:solidFill>
-                  <a:srgbClr val="ffffff"/>
-                </a:solidFill>
-                <a:latin typeface="Georgia"/>
-              </a:rPr>
+              <a:rPr lang="en-US"/>
               <a:t>Sixth Outline Level</a:t>
             </a:r>
             <a:endParaRPr/>
           </a:p>
           <a:p>
-            <a:pPr>
-              <a:lnSpc>
-                <a:spcPct val="100000"/>
-              </a:lnSpc>
-              <a:buFont typeface="Georgia"/>
-              <a:buChar char="•"/>
-            </a:pPr>
-            <a:r>
-              <a:rPr lang="en-US" sz="2000">
-                <a:solidFill>
-                  <a:srgbClr val="ffffff"/>
-                </a:solidFill>
-                <a:latin typeface="Georgia"/>
-              </a:rPr>
-              <a:t>Seventh Outline LevelClick to edit Master text styles</a:t>
-            </a:r>
-            <a:endParaRPr/>
-          </a:p>
-          <a:p>
-            <a:pPr lvl="1">
-              <a:lnSpc>
-                <a:spcPct val="100000"/>
-              </a:lnSpc>
-              <a:buFont typeface="Georgia"/>
-              <a:buChar char="▫"/>
-            </a:pPr>
-            <a:r>
-              <a:rPr lang="en-US" sz="1900">
-                <a:solidFill>
-                  <a:srgbClr val="438086"/>
-                </a:solidFill>
-                <a:latin typeface="Georgia"/>
-              </a:rPr>
-              <a:t>Second level</a:t>
-            </a:r>
-            <a:endParaRPr/>
-          </a:p>
-          <a:p>
-            <a:pPr lvl="1">
-              <a:buFont typeface="Georgia"/>
-              <a:buChar char="▫"/>
-            </a:pPr>
-            <a:r>
-              <a:rPr lang="en-US">
-                <a:solidFill>
-                  <a:srgbClr val="53548a"/>
-                </a:solidFill>
-                <a:latin typeface="Georgia"/>
-              </a:rPr>
-              <a:t>Third level</a:t>
-            </a:r>
-            <a:endParaRPr/>
-          </a:p>
-          <a:p>
-            <a:pPr lvl="2">
-              <a:buFont charset="2" typeface="Wingdings 2"/>
-              <a:buChar char=""/>
-            </a:pPr>
-            <a:r>
-              <a:rPr lang="en-US">
-                <a:solidFill>
-                  <a:srgbClr val="53548a"/>
-                </a:solidFill>
-                <a:latin typeface="Georgia"/>
-              </a:rPr>
-              <a:t>Fourth level</a:t>
-            </a:r>
-            <a:endParaRPr/>
-          </a:p>
-          <a:p>
-            <a:pPr lvl="3">
-              <a:buFont charset="2" typeface="Wingdings 2"/>
-              <a:buChar char=""/>
-            </a:pPr>
-            <a:r>
-              <a:rPr lang="en-US">
-                <a:solidFill>
-                  <a:srgbClr val="a04da3"/>
-                </a:solidFill>
-                <a:latin typeface="Georgia"/>
-              </a:rPr>
-              <a:t>Fifth level</a:t>
-            </a:r>
-            <a:endParaRPr/>
-          </a:p>
-        </p:txBody>
-      </p:sp>
-      <p:sp>
-        <p:nvSpPr>
-          <p:cNvPr id="15" name="PlaceHolder 16"/>
-          <p:cNvSpPr>
-            <a:spLocks noGrp="1"/>
-          </p:cNvSpPr>
-          <p:nvPr>
-            <p:ph type="body"/>
-          </p:nvPr>
-        </p:nvSpPr>
-        <p:spPr>
-          <a:xfrm>
-            <a:off x="4648320" y="2249280"/>
-            <a:ext cx="4038120" cy="4525560"/>
-          </a:xfrm>
-          <a:prstGeom prst="rect">
-            <a:avLst/>
-          </a:prstGeom>
-        </p:spPr>
-        <p:txBody>
-          <a:bodyPr bIns="45000" lIns="90000" rIns="90000" tIns="45000"/>
-          <a:p>
-            <a:pPr>
+            <a:pPr lvl="6">
               <a:buSzPct val="45000"/>
               <a:buFont typeface="StarSymbol"/>
               <a:buChar char=""/>
             </a:pPr>
             <a:r>
-              <a:rPr lang="en-US" sz="2000">
-                <a:solidFill>
-                  <a:srgbClr val="438086"/>
-                </a:solidFill>
-                <a:latin typeface="Georgia"/>
-              </a:rPr>
+              <a:rPr lang="en-US"/>
+              <a:t>Seventh Outline Level</a:t>
+            </a:r>
+            <a:endParaRPr/>
+          </a:p>
+        </p:txBody>
+      </p:sp>
+      <p:sp>
+        <p:nvSpPr>
+          <p:cNvPr id="15" name="PlaceHolder 16"/>
+          <p:cNvSpPr>
+            <a:spLocks noGrp="1"/>
+          </p:cNvSpPr>
+          <p:nvPr>
+            <p:ph type="body"/>
+          </p:nvPr>
+        </p:nvSpPr>
+        <p:spPr>
+          <a:xfrm>
+            <a:off x="2526120" y="2249280"/>
+            <a:ext cx="1969920" cy="4525200"/>
+          </a:xfrm>
+          <a:prstGeom prst="rect">
+            <a:avLst/>
+          </a:prstGeom>
+        </p:spPr>
+        <p:txBody>
+          <a:bodyPr bIns="0" lIns="0" rIns="0" tIns="0" wrap="none"/>
+          <a:p>
+            <a:r>
+              <a:rPr lang="en-US"/>
               <a:t>Click to edit the outline text format</a:t>
             </a:r>
             <a:endParaRPr/>
@@ -1681,12 +1558,7 @@
               <a:buChar char=""/>
             </a:pPr>
             <a:r>
-              <a:rPr lang="en-US" sz="2000">
-                <a:solidFill>
-                  <a:srgbClr val="438086"/>
-                </a:solidFill>
-                <a:latin typeface="Georgia"/>
-              </a:rPr>
+              <a:rPr lang="en-US"/>
               <a:t>Second Outline Level</a:t>
             </a:r>
             <a:endParaRPr/>
@@ -1698,12 +1570,7 @@
               <a:buChar char=""/>
             </a:pPr>
             <a:r>
-              <a:rPr lang="en-US" sz="2000">
-                <a:solidFill>
-                  <a:srgbClr val="438086"/>
-                </a:solidFill>
-                <a:latin typeface="Georgia"/>
-              </a:rPr>
+              <a:rPr lang="en-US"/>
               <a:t>Third Outline Level</a:t>
             </a:r>
             <a:endParaRPr/>
@@ -1715,12 +1582,7 @@
               <a:buChar char=""/>
             </a:pPr>
             <a:r>
-              <a:rPr lang="en-US" sz="2000">
-                <a:solidFill>
-                  <a:srgbClr val="438086"/>
-                </a:solidFill>
-                <a:latin typeface="Georgia"/>
-              </a:rPr>
+              <a:rPr lang="en-US"/>
               <a:t>Fourth Outline Level</a:t>
             </a:r>
             <a:endParaRPr/>
@@ -1732,12 +1594,7 @@
               <a:buChar char=""/>
             </a:pPr>
             <a:r>
-              <a:rPr lang="en-US" sz="2000">
-                <a:solidFill>
-                  <a:srgbClr val="438086"/>
-                </a:solidFill>
-                <a:latin typeface="Georgia"/>
-              </a:rPr>
+              <a:rPr lang="en-US"/>
               <a:t>Fifth Outline Level</a:t>
             </a:r>
             <a:endParaRPr/>
@@ -1749,206 +1606,21 @@
               <a:buChar char=""/>
             </a:pPr>
             <a:r>
-              <a:rPr lang="en-US" sz="2000">
-                <a:solidFill>
-                  <a:srgbClr val="438086"/>
-                </a:solidFill>
-                <a:latin typeface="Georgia"/>
-              </a:rPr>
+              <a:rPr lang="en-US"/>
               <a:t>Sixth Outline Level</a:t>
             </a:r>
             <a:endParaRPr/>
           </a:p>
           <a:p>
-            <a:pPr>
-              <a:lnSpc>
-                <a:spcPct val="100000"/>
-              </a:lnSpc>
-              <a:buFont typeface="Georgia"/>
-              <a:buChar char="•"/>
+            <a:pPr lvl="6">
+              <a:buSzPct val="45000"/>
+              <a:buFont typeface="StarSymbol"/>
+              <a:buChar char=""/>
             </a:pPr>
             <a:r>
-              <a:rPr lang="en-US" sz="2000">
-                <a:solidFill>
-                  <a:srgbClr val="438086"/>
-                </a:solidFill>
-                <a:latin typeface="Georgia"/>
-              </a:rPr>
-              <a:t>Seventh Outline LevelClick to edit Master text styles</a:t>
+              <a:rPr lang="en-US"/>
+              <a:t>Seventh Outline Level</a:t>
             </a:r>
-            <a:endParaRPr/>
-          </a:p>
-          <a:p>
-            <a:pPr lvl="1">
-              <a:lnSpc>
-                <a:spcPct val="100000"/>
-              </a:lnSpc>
-              <a:buFont typeface="Georgia"/>
-              <a:buChar char="▫"/>
-            </a:pPr>
-            <a:r>
-              <a:rPr lang="en-US" sz="1900">
-                <a:solidFill>
-                  <a:srgbClr val="438086"/>
-                </a:solidFill>
-                <a:latin typeface="Georgia"/>
-              </a:rPr>
-              <a:t>Second level</a:t>
-            </a:r>
-            <a:endParaRPr/>
-          </a:p>
-          <a:p>
-            <a:pPr lvl="1">
-              <a:buFont typeface="Georgia"/>
-              <a:buChar char="▫"/>
-            </a:pPr>
-            <a:r>
-              <a:rPr lang="en-US">
-                <a:solidFill>
-                  <a:srgbClr val="53548a"/>
-                </a:solidFill>
-                <a:latin typeface="Georgia"/>
-              </a:rPr>
-              <a:t>Third level</a:t>
-            </a:r>
-            <a:endParaRPr/>
-          </a:p>
-          <a:p>
-            <a:pPr lvl="2">
-              <a:buFont charset="2" typeface="Wingdings 2"/>
-              <a:buChar char=""/>
-            </a:pPr>
-            <a:r>
-              <a:rPr lang="en-US">
-                <a:solidFill>
-                  <a:srgbClr val="53548a"/>
-                </a:solidFill>
-                <a:latin typeface="Georgia"/>
-              </a:rPr>
-              <a:t>Fourth level</a:t>
-            </a:r>
-            <a:endParaRPr/>
-          </a:p>
-          <a:p>
-            <a:pPr lvl="3">
-              <a:buFont charset="2" typeface="Wingdings 2"/>
-              <a:buChar char=""/>
-            </a:pPr>
-            <a:r>
-              <a:rPr lang="en-US">
-                <a:solidFill>
-                  <a:srgbClr val="a04da3"/>
-                </a:solidFill>
-                <a:latin typeface="Georgia"/>
-              </a:rPr>
-              <a:t>Fifth level</a:t>
-            </a:r>
-            <a:endParaRPr/>
-          </a:p>
-        </p:txBody>
-      </p:sp>
-      <p:sp>
-        <p:nvSpPr>
-          <p:cNvPr id="16" name="PlaceHolder 17"/>
-          <p:cNvSpPr>
-            <a:spLocks noGrp="1"/>
-          </p:cNvSpPr>
-          <p:nvPr>
-            <p:ph type="dt"/>
-          </p:nvPr>
-        </p:nvSpPr>
-        <p:spPr>
-          <a:xfrm>
-            <a:off x="0" y="0"/>
-            <a:ext cx="-11796840" cy="-11796840"/>
-          </a:xfrm>
-          <a:prstGeom prst="rect">
-            <a:avLst/>
-          </a:prstGeom>
-        </p:spPr>
-        <p:txBody>
-          <a:bodyPr bIns="45000" lIns="90000" rIns="90000" tIns="45000"/>
-          <a:p>
-            <a:pPr>
-              <a:lnSpc>
-                <a:spcPct val="100000"/>
-              </a:lnSpc>
-            </a:pPr>
-            <a:r>
-              <a:rPr lang="en-US">
-                <a:solidFill>
-                  <a:srgbClr val="ffffff"/>
-                </a:solidFill>
-                <a:latin typeface="Georgia"/>
-              </a:rPr>
-              <a:t>2/21/13</a:t>
-            </a:r>
-            <a:endParaRPr/>
-          </a:p>
-        </p:txBody>
-      </p:sp>
-      <p:sp>
-        <p:nvSpPr>
-          <p:cNvPr id="17" name="PlaceHolder 18"/>
-          <p:cNvSpPr>
-            <a:spLocks noGrp="1"/>
-          </p:cNvSpPr>
-          <p:nvPr>
-            <p:ph type="ftr"/>
-          </p:nvPr>
-        </p:nvSpPr>
-        <p:spPr>
-          <a:xfrm>
-            <a:off x="0" y="0"/>
-            <a:ext cx="-11796840" cy="-11796840"/>
-          </a:xfrm>
-          <a:prstGeom prst="rect">
-            <a:avLst/>
-          </a:prstGeom>
-        </p:spPr>
-        <p:txBody>
-          <a:bodyPr bIns="45000" lIns="90000" rIns="90000" tIns="45000"/>
-          <a:p>
-            <a:endParaRPr/>
-          </a:p>
-        </p:txBody>
-      </p:sp>
-      <p:sp>
-        <p:nvSpPr>
-          <p:cNvPr id="18" name="PlaceHolder 19"/>
-          <p:cNvSpPr>
-            <a:spLocks noGrp="1"/>
-          </p:cNvSpPr>
-          <p:nvPr>
-            <p:ph type="sldNum"/>
-          </p:nvPr>
-        </p:nvSpPr>
-        <p:spPr>
-          <a:xfrm>
-            <a:off x="0" y="0"/>
-            <a:ext cx="-11796840" cy="-11796840"/>
-          </a:xfrm>
-          <a:prstGeom prst="rect">
-            <a:avLst/>
-          </a:prstGeom>
-        </p:spPr>
-        <p:txBody>
-          <a:bodyPr bIns="45000" lIns="90000" rIns="90000" tIns="45000"/>
-          <a:p>
-            <a:pPr>
-              <a:lnSpc>
-                <a:spcPct val="100000"/>
-              </a:lnSpc>
-            </a:pPr>
-            <a:fld id="{F1F15191-5121-4121-B121-41B1A1011121}" type="slidenum">
-              <a:rPr lang="en-US">
-                <a:solidFill>
-                  <a:srgbClr val="ffffff"/>
-                </a:solidFill>
-                <a:latin typeface="Georgia"/>
-              </a:rPr>
-              <a:t>&lt;number&gt;</a:t>
-            </a:fld>
             <a:endParaRPr/>
           </a:p>
         </p:txBody>
@@ -1992,14 +1664,14 @@
       </p:grpSpPr>
       <p:sp>
         <p:nvSpPr>
-          <p:cNvPr id="51" name="TextShape 1"/>
-          <p:cNvSpPr txBox="1"/>
+          <p:cNvPr id="48" name="CustomShape 1"/>
+          <p:cNvSpPr/>
           <p:nvPr/>
         </p:nvSpPr>
         <p:spPr>
           <a:xfrm>
             <a:off x="8186760" y="6400800"/>
-            <a:ext cx="956880" cy="456840"/>
+            <a:ext cx="956520" cy="456480"/>
           </a:xfrm>
           <a:prstGeom prst="rect">
             <a:avLst/>
@@ -2026,37 +1698,127 @@
           </a:p>
         </p:txBody>
       </p:sp>
+      <p:pic>
+        <p:nvPicPr>
+          <p:cNvPr descr="" id="49" name=""/>
+          <p:cNvPicPr/>
+          <p:nvPr/>
+        </p:nvPicPr>
+        <p:blipFill>
+          <a:blip r:embed="rId1"/>
+          <a:stretch>
+            <a:fillRect/>
+          </a:stretch>
+        </p:blipFill>
+        <p:spPr>
+          <a:xfrm>
+            <a:off x="310320" y="2377440"/>
+            <a:ext cx="4411080" cy="3497400"/>
+          </a:xfrm>
+          <a:prstGeom prst="rect">
+            <a:avLst/>
+          </a:prstGeom>
+        </p:spPr>
+      </p:pic>
+      <p:sp>
+        <p:nvSpPr>
+          <p:cNvPr id="50" name="TextShape 2"/>
+          <p:cNvSpPr txBox="1"/>
+          <p:nvPr/>
+        </p:nvSpPr>
+        <p:spPr>
+          <a:xfrm>
+            <a:off x="366480" y="670680"/>
+            <a:ext cx="8228880" cy="1250280"/>
+          </a:xfrm>
+          <a:prstGeom prst="rect">
+            <a:avLst/>
+          </a:prstGeom>
+        </p:spPr>
+        <p:txBody>
+          <a:bodyPr anchor="ctr" bIns="0" lIns="0" rIns="0" tIns="0" wrap="none"/>
+          <a:p>
+            <a:pPr algn="ctr"/>
+            <a:r>
+              <a:rPr lang="en-US" sz="4400">
+                <a:latin typeface="Arial"/>
+                <a:ea typeface="Droid Sans"/>
+              </a:rPr>
+              <a:t>New Energy Storage Medium Could Possibly Replace Battery</a:t>
+            </a:r>
+            <a:endParaRPr/>
+          </a:p>
+        </p:txBody>
+      </p:sp>
+      <p:sp>
+        <p:nvSpPr>
+          <p:cNvPr id="51" name="TextShape 3"/>
+          <p:cNvSpPr txBox="1"/>
+          <p:nvPr/>
+        </p:nvSpPr>
+        <p:spPr>
+          <a:xfrm>
+            <a:off x="4846320" y="2103120"/>
+            <a:ext cx="3886920" cy="4525200"/>
+          </a:xfrm>
+          <a:prstGeom prst="rect">
+            <a:avLst/>
+          </a:prstGeom>
+        </p:spPr>
+        <p:txBody>
+          <a:bodyPr bIns="0" lIns="0" rIns="0" tIns="0" wrap="none"/>
+          <a:p>
+            <a:pPr>
+              <a:buSzPct val="45000"/>
+              <a:buFont typeface="StarSymbol"/>
+              <a:buChar char=""/>
+            </a:pPr>
+            <a:r>
+              <a:rPr lang="en-US"/>
+              <a:t>Competitive or better than current battery life.</a:t>
+            </a:r>
+            <a:endParaRPr/>
+          </a:p>
+          <a:p>
+            <a:pPr>
+              <a:buSzPct val="45000"/>
+              <a:buFont typeface="StarSymbol"/>
+              <a:buChar char=""/>
+            </a:pPr>
+            <a:r>
+              <a:rPr lang="en-US"/>
+              <a:t>Non-toxic and biodegradable</a:t>
+            </a:r>
+            <a:endParaRPr/>
+          </a:p>
+          <a:p>
+            <a:pPr>
+              <a:buSzPct val="45000"/>
+              <a:buFont typeface="StarSymbol"/>
+              <a:buChar char=""/>
+            </a:pPr>
+            <a:r>
+              <a:rPr lang="en-US"/>
+              <a:t>Extremely cheap</a:t>
+            </a:r>
+            <a:endParaRPr/>
+          </a:p>
+          <a:p>
+            <a:pPr>
+              <a:buSzPct val="45000"/>
+              <a:buFont typeface="StarSymbol"/>
+              <a:buChar char=""/>
+            </a:pPr>
+            <a:r>
+              <a:rPr lang="en-US"/>
+              <a:t>Easily produced with common tools</a:t>
+            </a:r>
+            <a:endParaRPr/>
+          </a:p>
+        </p:txBody>
+      </p:sp>
     </p:spTree>
   </p:cSld>
-  <p:timing>
-    <p:tnLst>
-      <p:par>
-        <p:cTn dur="indefinite" id="1" nodeType="tmRoot" restart="never">
-          <p:childTnLst>
-            <p:seq>
-              <p:cTn id="2" nodeType="mainSeq">
-                <p:childTnLst/>
-              </p:cTn>
-              <p:prevCondLst>
-                <p:cond delay="0" evt="onPrev">
-                  <p:tgtEl>
-                    <p:sldTgt/>
-                  </p:tgtEl>
-                </p:cond>
-              </p:prevCondLst>
-              <p:nextCondLst>
-                <p:cond delay="0" evt="onNext">
-                  <p:tgtEl>
-                    <p:sldTgt/>
-                  </p:tgtEl>
-                </p:cond>
-              </p:nextCondLst>
-            </p:seq>
-          </p:childTnLst>
-        </p:cTn>
-      </p:par>
-    </p:tnLst>
-  </p:timing>
 </p:sld>
 </file>
 

</xml_diff>